<commit_message>
Create screencast of results and perform tweaks on poster.
</commit_message>
<xml_diff>
--- a/admin-docs/EE559_A0_poster_group7.pptx
+++ b/admin-docs/EE559_A0_poster_group7.pptx
@@ -241,7 +241,73 @@
       </a:defRPr>
     </a:lvl9pPr>
   </p:defaultTextStyle>
+  <p:extLst>
+    <p:ext uri="{EFAFB233-063F-42B5-8137-9DF3F51BA10A}">
+      <p15:sldGuideLst xmlns:p15="http://schemas.microsoft.com/office/powerpoint/2012/main"/>
+    </p:ext>
+  </p:extLst>
 </p:presentation>
+</file>
+
+<file path=ppt/revisionInfo.xml><?xml version="1.0" encoding="utf-8"?>
+<p1510:revInfo xmlns:a="http://schemas.openxmlformats.org/drawingml/2006/main" xmlns:r="http://schemas.openxmlformats.org/officeDocument/2006/relationships" xmlns:p1510="http://schemas.microsoft.com/office/powerpoint/2015/10/main">
+  <p1510:revLst>
+    <p1510:client id="{5CF01C1F-9338-4C6A-85E1-1E8FF5C2BC92}" v="2" dt="2024-05-26T14:47:16.741"/>
+  </p1510:revLst>
+</p1510:revInfo>
+</file>
+
+<file path=ppt/changesInfos/changesInfo1.xml><?xml version="1.0" encoding="utf-8"?>
+<pc:chgInfo xmlns:a="http://schemas.openxmlformats.org/drawingml/2006/main" xmlns:r="http://schemas.openxmlformats.org/officeDocument/2006/relationships" xmlns:ac="http://schemas.microsoft.com/office/drawing/2013/main/command" xmlns:pc="http://schemas.microsoft.com/office/powerpoint/2013/main/command">
+  <pc:docChgLst>
+    <pc:chgData name="Marc Schenk" userId="dd997220bc2cbd62" providerId="LiveId" clId="{5CF01C1F-9338-4C6A-85E1-1E8FF5C2BC92}"/>
+    <pc:docChg chg="undo custSel modSld">
+      <pc:chgData name="Marc Schenk" userId="dd997220bc2cbd62" providerId="LiveId" clId="{5CF01C1F-9338-4C6A-85E1-1E8FF5C2BC92}" dt="2024-05-26T14:49:56.795" v="98" actId="20577"/>
+      <pc:docMkLst>
+        <pc:docMk/>
+      </pc:docMkLst>
+      <pc:sldChg chg="modSp mod">
+        <pc:chgData name="Marc Schenk" userId="dd997220bc2cbd62" providerId="LiveId" clId="{5CF01C1F-9338-4C6A-85E1-1E8FF5C2BC92}" dt="2024-05-26T14:49:56.795" v="98" actId="20577"/>
+        <pc:sldMkLst>
+          <pc:docMk/>
+          <pc:sldMk cId="0" sldId="256"/>
+        </pc:sldMkLst>
+        <pc:spChg chg="mod">
+          <ac:chgData name="Marc Schenk" userId="dd997220bc2cbd62" providerId="LiveId" clId="{5CF01C1F-9338-4C6A-85E1-1E8FF5C2BC92}" dt="2024-05-26T14:41:46.725" v="1" actId="20577"/>
+          <ac:spMkLst>
+            <pc:docMk/>
+            <pc:sldMk cId="0" sldId="256"/>
+            <ac:spMk id="56" creationId="{00000000-0000-0000-0000-000000000000}"/>
+          </ac:spMkLst>
+        </pc:spChg>
+        <pc:spChg chg="mod">
+          <ac:chgData name="Marc Schenk" userId="dd997220bc2cbd62" providerId="LiveId" clId="{5CF01C1F-9338-4C6A-85E1-1E8FF5C2BC92}" dt="2024-05-26T14:42:57.072" v="4" actId="20577"/>
+          <ac:spMkLst>
+            <pc:docMk/>
+            <pc:sldMk cId="0" sldId="256"/>
+            <ac:spMk id="72" creationId="{00000000-0000-0000-0000-000000000000}"/>
+          </ac:spMkLst>
+        </pc:spChg>
+        <pc:graphicFrameChg chg="mod modGraphic">
+          <ac:chgData name="Marc Schenk" userId="dd997220bc2cbd62" providerId="LiveId" clId="{5CF01C1F-9338-4C6A-85E1-1E8FF5C2BC92}" dt="2024-05-26T14:49:20.584" v="97" actId="20577"/>
+          <ac:graphicFrameMkLst>
+            <pc:docMk/>
+            <pc:sldMk cId="0" sldId="256"/>
+            <ac:graphicFrameMk id="2" creationId="{5570DEB5-2492-BB3A-EA89-10FD5F3A98EC}"/>
+          </ac:graphicFrameMkLst>
+        </pc:graphicFrameChg>
+        <pc:graphicFrameChg chg="modGraphic">
+          <ac:chgData name="Marc Schenk" userId="dd997220bc2cbd62" providerId="LiveId" clId="{5CF01C1F-9338-4C6A-85E1-1E8FF5C2BC92}" dt="2024-05-26T14:49:56.795" v="98" actId="20577"/>
+          <ac:graphicFrameMkLst>
+            <pc:docMk/>
+            <pc:sldMk cId="0" sldId="256"/>
+            <ac:graphicFrameMk id="77" creationId="{00000000-0000-0000-0000-000000000000}"/>
+          </ac:graphicFrameMkLst>
+        </pc:graphicFrameChg>
+      </pc:sldChg>
+    </pc:docChg>
+  </pc:docChgLst>
+</pc:chgInfo>
 </file>
 
 <file path=ppt/notesMasters/notesMaster1.xml><?xml version="1.0" encoding="utf-8"?>
@@ -5738,7 +5804,7 @@
               <a:buNone/>
             </a:pPr>
             <a:r>
-              <a:rPr lang="en-GB" sz="8000">
+              <a:rPr lang="en-GB" sz="8000" dirty="0">
                 <a:solidFill>
                   <a:srgbClr val="143264"/>
                 </a:solidFill>
@@ -5746,14 +5812,14 @@
               <a:t>Leveraging Translation-Based</a:t>
             </a:r>
             <a:br>
-              <a:rPr lang="en-GB" sz="8000">
+              <a:rPr lang="en-GB" sz="8000" dirty="0">
                 <a:solidFill>
                   <a:srgbClr val="143264"/>
                 </a:solidFill>
               </a:rPr>
             </a:br>
             <a:r>
-              <a:rPr lang="en-GB" sz="8000">
+              <a:rPr lang="en-GB" sz="8000" dirty="0">
                 <a:solidFill>
                   <a:srgbClr val="143264"/>
                 </a:solidFill>
@@ -5775,12 +5841,12 @@
               <a:buNone/>
             </a:pPr>
             <a:r>
-              <a:rPr lang="en-GB" sz="8000">
+              <a:rPr lang="en-GB" sz="8000" dirty="0">
                 <a:solidFill>
                   <a:srgbClr val="143264"/>
                 </a:solidFill>
               </a:rPr>
-              <a:t>Detection in Low Resource Languages</a:t>
+              <a:t>Detection in Low-Resource Languages</a:t>
             </a:r>
           </a:p>
         </p:txBody>
@@ -6808,7 +6874,7 @@
                   <a:schemeClr val="dk2"/>
                 </a:solidFill>
               </a:rPr>
-              <a:t>Hate speech detection in low –resource languages is limited by the scarcity of annotated data, which hinders the effectiveness of classifiers. This project aims to enhance hate speech detection in Arabic, a low-resource language, by leveraging translation-based transfer learning. The goal is to improve classification performance by fine-tuning pre-trained BERT-based models on a large English dataset and then finetuning them with English translations of an Arabic dataset. </a:t>
+              <a:t>Hate speech detection in low-resource languages is limited by the scarcity of annotated data, which hinders the effectiveness of classifiers. This project aims to enhance hate speech detection in Arabic, a low-resource language, by leveraging translation-based transfer learning. The goal is to improve classification performance by fine-tuning pre-trained BERT-based models on a large English dataset and then finetuning them with English translations of an Arabic dataset. </a:t>
             </a:r>
           </a:p>
         </p:txBody>
@@ -7199,7 +7265,7 @@
           <p:nvPr>
             <p:extLst>
               <p:ext uri="{D42A27DB-BD31-4B8C-83A1-F6EECF244321}">
-                <p14:modId xmlns:p14="http://schemas.microsoft.com/office/powerpoint/2010/main" val="3915492938"/>
+                <p14:modId xmlns:p14="http://schemas.microsoft.com/office/powerpoint/2010/main" val="570984116"/>
               </p:ext>
             </p:extLst>
           </p:nvPr>
@@ -8023,6 +8089,10 @@
                         <a:defRPr/>
                       </a:pPr>
                       <a:r>
+                        <a:rPr lang="de-CH" sz="3700" dirty="0"/>
+                        <a:t> </a:t>
+                      </a:r>
+                      <a:r>
                         <a:rPr lang="de-CH" sz="3700" dirty="0" err="1"/>
                         <a:t>RoBERTa</a:t>
                       </a:r>
@@ -8147,8 +8217,8 @@
                         <a:buNone/>
                       </a:pPr>
                       <a:r>
-                        <a:rPr lang="de-CH" sz="3700" dirty="0"/>
-                        <a:t>0.6825</a:t>
+                        <a:rPr lang="de-CH" sz="3700"/>
+                        <a:t>0.6828</a:t>
                       </a:r>
                       <a:endParaRPr sz="3700" dirty="0"/>
                     </a:p>
@@ -8275,7 +8345,7 @@
           <p:nvPr>
             <p:extLst>
               <p:ext uri="{D42A27DB-BD31-4B8C-83A1-F6EECF244321}">
-                <p14:modId xmlns:p14="http://schemas.microsoft.com/office/powerpoint/2010/main" val="2447010439"/>
+                <p14:modId xmlns:p14="http://schemas.microsoft.com/office/powerpoint/2010/main" val="4001394260"/>
               </p:ext>
             </p:extLst>
           </p:nvPr>
@@ -9096,12 +9166,12 @@
                         <a:defRPr/>
                       </a:pPr>
                       <a:r>
-                        <a:rPr lang="de-CH" sz="3700" dirty="0" err="1"/>
-                        <a:t>RoBERTa</a:t>
+                        <a:rPr lang="de-CH" sz="3700" dirty="0"/>
+                        <a:t> </a:t>
                       </a:r>
                       <a:r>
-                        <a:rPr lang="de-CH" sz="3700" dirty="0"/>
-                        <a:t> CC</a:t>
+                        <a:rPr lang="de-CH" sz="3700" dirty="0" err="1"/>
+                        <a:t>BERTweet</a:t>
                       </a:r>
                       <a:endParaRPr sz="3700" dirty="0"/>
                     </a:p>
@@ -9160,7 +9230,7 @@
                         <a:buNone/>
                       </a:pPr>
                       <a:r>
-                        <a:rPr lang="en-GB" sz="3700" noProof="0"/>
+                        <a:rPr lang="en-GB" sz="3700" noProof="0" dirty="0"/>
                         <a:t>Arabic T</a:t>
                       </a:r>
                     </a:p>
@@ -9220,7 +9290,7 @@
                       </a:pPr>
                       <a:r>
                         <a:rPr lang="de-CH" sz="3700" dirty="0"/>
-                        <a:t>0.7135</a:t>
+                        <a:t>0.6989</a:t>
                       </a:r>
                       <a:endParaRPr sz="3700" dirty="0"/>
                     </a:p>
@@ -9280,7 +9350,7 @@
                       </a:pPr>
                       <a:r>
                         <a:rPr lang="de-CH" sz="3700" dirty="0"/>
-                        <a:t>0.0181</a:t>
+                        <a:t>0.0183</a:t>
                       </a:r>
                       <a:endParaRPr sz="3700" dirty="0"/>
                     </a:p>
@@ -9356,8 +9426,16 @@
                         <a:defRPr/>
                       </a:pPr>
                       <a:r>
+                        <a:rPr lang="de-CH" sz="3700" dirty="0"/>
+                        <a:t> </a:t>
+                      </a:r>
+                      <a:r>
                         <a:rPr lang="de-CH" sz="3700" dirty="0" err="1"/>
-                        <a:t>BERTweet</a:t>
+                        <a:t>RoBERTa</a:t>
+                      </a:r>
+                      <a:r>
+                        <a:rPr lang="de-CH" sz="3700" dirty="0"/>
+                        <a:t> CC</a:t>
                       </a:r>
                       <a:endParaRPr sz="3700" dirty="0"/>
                     </a:p>
@@ -9476,7 +9554,7 @@
                       </a:pPr>
                       <a:r>
                         <a:rPr lang="de-CH" sz="3700" dirty="0"/>
-                        <a:t>0.6989</a:t>
+                        <a:t>0.7135</a:t>
                       </a:r>
                       <a:endParaRPr sz="3700" dirty="0"/>
                     </a:p>
@@ -9536,7 +9614,7 @@
                       </a:pPr>
                       <a:r>
                         <a:rPr lang="de-CH" sz="3700" dirty="0"/>
-                        <a:t>0.0183</a:t>
+                        <a:t>0.0181</a:t>
                       </a:r>
                       <a:endParaRPr sz="3700" dirty="0"/>
                     </a:p>

</xml_diff>

<commit_message>
Adjust affiliation in poster.
</commit_message>
<xml_diff>
--- a/admin-docs/EE559_A0_poster_group7.pptx
+++ b/admin-docs/EE559_A0_poster_group7.pptx
@@ -241,6 +241,11 @@
       </a:defRPr>
     </a:lvl9pPr>
   </p:defaultTextStyle>
+  <p:extLst>
+    <p:ext uri="{EFAFB233-063F-42B5-8137-9DF3F51BA10A}">
+      <p15:sldGuideLst xmlns:p15="http://schemas.microsoft.com/office/powerpoint/2012/main"/>
+    </p:ext>
+  </p:extLst>
 </p:presentation>
 </file>
 
@@ -5997,12 +6002,12 @@
               <a:buNone/>
             </a:pPr>
             <a:r>
-              <a:rPr lang="en-GB" sz="3600">
+              <a:rPr lang="en-GB" sz="3600" dirty="0">
                 <a:solidFill>
                   <a:schemeClr val="dk1"/>
                 </a:solidFill>
               </a:rPr>
-              <a:t>Group 7</a:t>
+              <a:t>Group 7, EPFL</a:t>
             </a:r>
           </a:p>
         </p:txBody>

</xml_diff>